<commit_message>
Logo images & some business documents created
</commit_message>
<xml_diff>
--- a/Cabana_app/Logo Image/Logo_Image_Maker.pptx
+++ b/Cabana_app/Logo Image/Logo_Image_Maker.pptx
@@ -12,6 +12,7 @@
     <p:sldId id="261" r:id="rId6"/>
     <p:sldId id="262" r:id="rId7"/>
     <p:sldId id="263" r:id="rId8"/>
+    <p:sldId id="264" r:id="rId9"/>
   </p:sldIdLst>
   <p:sldSz cx="12192000" cy="6858000"/>
   <p:notesSz cx="6858000" cy="9144000"/>
@@ -265,7 +266,7 @@
           <a:p>
             <a:fld id="{F07DDBF7-C1C3-489F-ACD8-4139F625497A}" type="datetimeFigureOut">
               <a:rPr lang="en-US" smtClean="0"/>
-              <a:t>1/27/2024</a:t>
+              <a:t>3/12/2024</a:t>
             </a:fld>
             <a:endParaRPr lang="en-US"/>
           </a:p>
@@ -463,7 +464,7 @@
           <a:p>
             <a:fld id="{F07DDBF7-C1C3-489F-ACD8-4139F625497A}" type="datetimeFigureOut">
               <a:rPr lang="en-US" smtClean="0"/>
-              <a:t>1/27/2024</a:t>
+              <a:t>3/12/2024</a:t>
             </a:fld>
             <a:endParaRPr lang="en-US"/>
           </a:p>
@@ -671,7 +672,7 @@
           <a:p>
             <a:fld id="{F07DDBF7-C1C3-489F-ACD8-4139F625497A}" type="datetimeFigureOut">
               <a:rPr lang="en-US" smtClean="0"/>
-              <a:t>1/27/2024</a:t>
+              <a:t>3/12/2024</a:t>
             </a:fld>
             <a:endParaRPr lang="en-US"/>
           </a:p>
@@ -869,7 +870,7 @@
           <a:p>
             <a:fld id="{F07DDBF7-C1C3-489F-ACD8-4139F625497A}" type="datetimeFigureOut">
               <a:rPr lang="en-US" smtClean="0"/>
-              <a:t>1/27/2024</a:t>
+              <a:t>3/12/2024</a:t>
             </a:fld>
             <a:endParaRPr lang="en-US"/>
           </a:p>
@@ -1144,7 +1145,7 @@
           <a:p>
             <a:fld id="{F07DDBF7-C1C3-489F-ACD8-4139F625497A}" type="datetimeFigureOut">
               <a:rPr lang="en-US" smtClean="0"/>
-              <a:t>1/27/2024</a:t>
+              <a:t>3/12/2024</a:t>
             </a:fld>
             <a:endParaRPr lang="en-US"/>
           </a:p>
@@ -1409,7 +1410,7 @@
           <a:p>
             <a:fld id="{F07DDBF7-C1C3-489F-ACD8-4139F625497A}" type="datetimeFigureOut">
               <a:rPr lang="en-US" smtClean="0"/>
-              <a:t>1/27/2024</a:t>
+              <a:t>3/12/2024</a:t>
             </a:fld>
             <a:endParaRPr lang="en-US"/>
           </a:p>
@@ -1821,7 +1822,7 @@
           <a:p>
             <a:fld id="{F07DDBF7-C1C3-489F-ACD8-4139F625497A}" type="datetimeFigureOut">
               <a:rPr lang="en-US" smtClean="0"/>
-              <a:t>1/27/2024</a:t>
+              <a:t>3/12/2024</a:t>
             </a:fld>
             <a:endParaRPr lang="en-US"/>
           </a:p>
@@ -1962,7 +1963,7 @@
           <a:p>
             <a:fld id="{F07DDBF7-C1C3-489F-ACD8-4139F625497A}" type="datetimeFigureOut">
               <a:rPr lang="en-US" smtClean="0"/>
-              <a:t>1/27/2024</a:t>
+              <a:t>3/12/2024</a:t>
             </a:fld>
             <a:endParaRPr lang="en-US"/>
           </a:p>
@@ -2075,7 +2076,7 @@
           <a:p>
             <a:fld id="{F07DDBF7-C1C3-489F-ACD8-4139F625497A}" type="datetimeFigureOut">
               <a:rPr lang="en-US" smtClean="0"/>
-              <a:t>1/27/2024</a:t>
+              <a:t>3/12/2024</a:t>
             </a:fld>
             <a:endParaRPr lang="en-US"/>
           </a:p>
@@ -2386,7 +2387,7 @@
           <a:p>
             <a:fld id="{F07DDBF7-C1C3-489F-ACD8-4139F625497A}" type="datetimeFigureOut">
               <a:rPr lang="en-US" smtClean="0"/>
-              <a:t>1/27/2024</a:t>
+              <a:t>3/12/2024</a:t>
             </a:fld>
             <a:endParaRPr lang="en-US"/>
           </a:p>
@@ -2674,7 +2675,7 @@
           <a:p>
             <a:fld id="{F07DDBF7-C1C3-489F-ACD8-4139F625497A}" type="datetimeFigureOut">
               <a:rPr lang="en-US" smtClean="0"/>
-              <a:t>1/27/2024</a:t>
+              <a:t>3/12/2024</a:t>
             </a:fld>
             <a:endParaRPr lang="en-US"/>
           </a:p>
@@ -2915,7 +2916,7 @@
           <a:p>
             <a:fld id="{F07DDBF7-C1C3-489F-ACD8-4139F625497A}" type="datetimeFigureOut">
               <a:rPr lang="en-US" smtClean="0"/>
-              <a:t>1/27/2024</a:t>
+              <a:t>3/12/2024</a:t>
             </a:fld>
             <a:endParaRPr lang="en-US"/>
           </a:p>
@@ -10104,16 +10105,12 @@
               </a:rPr>
             </a:br>
             <a:r>
-              <a:rPr lang="en-US" sz="4800" dirty="0" err="1">
+              <a:rPr lang="en-US" sz="4800" dirty="0">
                 <a:latin typeface="Berlin Sans FB Demi" panose="020E0802020502020306" pitchFamily="34" charset="0"/>
                 <a:ea typeface="Adobe Heiti Std R" panose="020B0400000000000000" pitchFamily="34" charset="-128"/>
               </a:rPr>
               <a:t>MyCabin</a:t>
             </a:r>
-            <a:endParaRPr lang="en-US" sz="4800" dirty="0">
-              <a:latin typeface="Berlin Sans FB Demi" panose="020E0802020502020306" pitchFamily="34" charset="0"/>
-              <a:ea typeface="Adobe Heiti Std R" panose="020B0400000000000000" pitchFamily="34" charset="-128"/>
-            </a:endParaRPr>
           </a:p>
         </p:txBody>
       </p:sp>
@@ -12137,7 +12134,7 @@
         </p:nvSpPr>
         <p:spPr>
           <a:xfrm>
-            <a:off x="5241075" y="2020276"/>
+            <a:off x="5241075" y="665545"/>
             <a:ext cx="3959227" cy="2337063"/>
           </a:xfrm>
           <a:prstGeom prst="rect">
@@ -12186,7 +12183,7 @@
         </p:nvGrpSpPr>
         <p:grpSpPr>
           <a:xfrm>
-            <a:off x="5347019" y="2557377"/>
+            <a:off x="5347019" y="1202646"/>
             <a:ext cx="3657600" cy="1407835"/>
             <a:chOff x="5285107" y="4829089"/>
             <a:chExt cx="3657600" cy="1407835"/>
@@ -12475,7 +12472,7 @@
         </p:nvGrpSpPr>
         <p:grpSpPr>
           <a:xfrm>
-            <a:off x="941562" y="2316077"/>
+            <a:off x="941562" y="961346"/>
             <a:ext cx="3657600" cy="1407835"/>
             <a:chOff x="932037" y="2557377"/>
             <a:chExt cx="3657600" cy="1407835"/>
@@ -12750,10 +12747,1252 @@
           </p:txBody>
         </p:sp>
       </p:grpSp>
+      <p:sp>
+        <p:nvSpPr>
+          <p:cNvPr id="10" name="Rectangle 9">
+            <a:extLst>
+              <a:ext uri="{FF2B5EF4-FFF2-40B4-BE49-F238E27FC236}">
+                <a16:creationId xmlns:a16="http://schemas.microsoft.com/office/drawing/2014/main" id="{E20F74CB-0563-923A-B99C-ED7845C32451}"/>
+              </a:ext>
+            </a:extLst>
+          </p:cNvPr>
+          <p:cNvSpPr/>
+          <p:nvPr/>
+        </p:nvSpPr>
+        <p:spPr>
+          <a:xfrm>
+            <a:off x="5241075" y="3479229"/>
+            <a:ext cx="3959227" cy="2337063"/>
+          </a:xfrm>
+          <a:prstGeom prst="rect">
+            <a:avLst/>
+          </a:prstGeom>
+          <a:solidFill>
+            <a:schemeClr val="tx1"/>
+          </a:solidFill>
+        </p:spPr>
+        <p:style>
+          <a:lnRef idx="2">
+            <a:schemeClr val="accent1">
+              <a:shade val="15000"/>
+            </a:schemeClr>
+          </a:lnRef>
+          <a:fillRef idx="1">
+            <a:schemeClr val="accent1"/>
+          </a:fillRef>
+          <a:effectRef idx="0">
+            <a:schemeClr val="accent1"/>
+          </a:effectRef>
+          <a:fontRef idx="minor">
+            <a:schemeClr val="lt1"/>
+          </a:fontRef>
+        </p:style>
+        <p:txBody>
+          <a:bodyPr rtlCol="0" anchor="ctr"/>
+          <a:lstStyle/>
+          <a:p>
+            <a:pPr algn="ctr"/>
+            <a:endParaRPr lang="en-US" dirty="0"/>
+          </a:p>
+        </p:txBody>
+      </p:sp>
+      <p:grpSp>
+        <p:nvGrpSpPr>
+          <p:cNvPr id="11" name="Group 10">
+            <a:extLst>
+              <a:ext uri="{FF2B5EF4-FFF2-40B4-BE49-F238E27FC236}">
+                <a16:creationId xmlns:a16="http://schemas.microsoft.com/office/drawing/2014/main" id="{6915A286-57B9-F26F-2922-12AB2E9738F1}"/>
+              </a:ext>
+            </a:extLst>
+          </p:cNvPr>
+          <p:cNvGrpSpPr/>
+          <p:nvPr/>
+        </p:nvGrpSpPr>
+        <p:grpSpPr>
+          <a:xfrm>
+            <a:off x="5508530" y="4052572"/>
+            <a:ext cx="3657600" cy="1371593"/>
+            <a:chOff x="5285107" y="4865331"/>
+            <a:chExt cx="3657600" cy="1371593"/>
+          </a:xfrm>
+        </p:grpSpPr>
+        <p:pic>
+          <p:nvPicPr>
+            <p:cNvPr id="19" name="Graphic 18" descr="Cabin with solid fill">
+              <a:extLst>
+                <a:ext uri="{FF2B5EF4-FFF2-40B4-BE49-F238E27FC236}">
+                  <a16:creationId xmlns:a16="http://schemas.microsoft.com/office/drawing/2014/main" id="{93E880A0-A362-9BCB-68C7-6AA6401B9CC7}"/>
+                </a:ext>
+              </a:extLst>
+            </p:cNvPr>
+            <p:cNvPicPr>
+              <a:picLocks noChangeAspect="1"/>
+            </p:cNvPicPr>
+            <p:nvPr/>
+          </p:nvPicPr>
+          <p:blipFill rotWithShape="1">
+            <a:blip r:embed="rId2">
+              <a:extLst>
+                <a:ext uri="{28A0092B-C50C-407E-A947-70E740481C1C}">
+                  <a14:useLocalDpi xmlns:a14="http://schemas.microsoft.com/office/drawing/2010/main" val="0"/>
+                </a:ext>
+                <a:ext uri="{96DAC541-7B7A-43D3-8B79-37D633B846F1}">
+                  <asvg:svgBlip xmlns:asvg="http://schemas.microsoft.com/office/drawing/2016/SVG/main" r:embed="rId3"/>
+                </a:ext>
+              </a:extLst>
+            </a:blip>
+            <a:srcRect b="10588"/>
+            <a:stretch/>
+          </p:blipFill>
+          <p:spPr>
+            <a:xfrm>
+              <a:off x="6497711" y="5257458"/>
+              <a:ext cx="1232393" cy="979465"/>
+            </a:xfrm>
+            <a:prstGeom prst="rect">
+              <a:avLst/>
+            </a:prstGeom>
+          </p:spPr>
+        </p:pic>
+        <p:pic>
+          <p:nvPicPr>
+            <p:cNvPr id="20" name="Graphic 19" descr="Mountains outline">
+              <a:extLst>
+                <a:ext uri="{FF2B5EF4-FFF2-40B4-BE49-F238E27FC236}">
+                  <a16:creationId xmlns:a16="http://schemas.microsoft.com/office/drawing/2014/main" id="{ABE4AFFD-95AC-8C39-E4A2-245827425CAF}"/>
+                </a:ext>
+              </a:extLst>
+            </p:cNvPr>
+            <p:cNvPicPr>
+              <a:picLocks noChangeAspect="1"/>
+            </p:cNvPicPr>
+            <p:nvPr/>
+          </p:nvPicPr>
+          <p:blipFill rotWithShape="1">
+            <a:blip r:embed="rId4">
+              <a:extLst>
+                <a:ext uri="{28A0092B-C50C-407E-A947-70E740481C1C}">
+                  <a14:useLocalDpi xmlns:a14="http://schemas.microsoft.com/office/drawing/2010/main" val="0"/>
+                </a:ext>
+                <a:ext uri="{96DAC541-7B7A-43D3-8B79-37D633B846F1}">
+                  <asvg:svgBlip xmlns:asvg="http://schemas.microsoft.com/office/drawing/2016/SVG/main" r:embed="rId5"/>
+                </a:ext>
+              </a:extLst>
+            </a:blip>
+            <a:srcRect t="19736" b="6343"/>
+            <a:stretch/>
+          </p:blipFill>
+          <p:spPr>
+            <a:xfrm>
+              <a:off x="5285107" y="4885058"/>
+              <a:ext cx="3657600" cy="1351866"/>
+            </a:xfrm>
+            <a:prstGeom prst="rect">
+              <a:avLst/>
+            </a:prstGeom>
+          </p:spPr>
+        </p:pic>
+        <p:pic>
+          <p:nvPicPr>
+            <p:cNvPr id="21" name="Graphic 20" descr="Forest scene with solid fill">
+              <a:extLst>
+                <a:ext uri="{FF2B5EF4-FFF2-40B4-BE49-F238E27FC236}">
+                  <a16:creationId xmlns:a16="http://schemas.microsoft.com/office/drawing/2014/main" id="{F7D3357E-48F7-D96A-E947-5675889472EA}"/>
+                </a:ext>
+              </a:extLst>
+            </p:cNvPr>
+            <p:cNvPicPr>
+              <a:picLocks noChangeAspect="1"/>
+            </p:cNvPicPr>
+            <p:nvPr/>
+          </p:nvPicPr>
+          <p:blipFill>
+            <a:blip r:embed="rId6">
+              <a:extLst>
+                <a:ext uri="{28A0092B-C50C-407E-A947-70E740481C1C}">
+                  <a14:useLocalDpi xmlns:a14="http://schemas.microsoft.com/office/drawing/2010/main" val="0"/>
+                </a:ext>
+                <a:ext uri="{96DAC541-7B7A-43D3-8B79-37D633B846F1}">
+                  <asvg:svgBlip xmlns:asvg="http://schemas.microsoft.com/office/drawing/2016/SVG/main" r:embed="rId7"/>
+                </a:ext>
+              </a:extLst>
+            </a:blip>
+            <a:stretch>
+              <a:fillRect/>
+            </a:stretch>
+          </p:blipFill>
+          <p:spPr>
+            <a:xfrm>
+              <a:off x="5477981" y="4986117"/>
+              <a:ext cx="1232393" cy="1095460"/>
+            </a:xfrm>
+            <a:prstGeom prst="rect">
+              <a:avLst/>
+            </a:prstGeom>
+          </p:spPr>
+        </p:pic>
+        <p:pic>
+          <p:nvPicPr>
+            <p:cNvPr id="22" name="Graphic 21" descr="Forest scene with solid fill">
+              <a:extLst>
+                <a:ext uri="{FF2B5EF4-FFF2-40B4-BE49-F238E27FC236}">
+                  <a16:creationId xmlns:a16="http://schemas.microsoft.com/office/drawing/2014/main" id="{D19170E7-96A4-1231-C299-9AB21D61DD00}"/>
+                </a:ext>
+              </a:extLst>
+            </p:cNvPr>
+            <p:cNvPicPr>
+              <a:picLocks noChangeAspect="1"/>
+            </p:cNvPicPr>
+            <p:nvPr/>
+          </p:nvPicPr>
+          <p:blipFill>
+            <a:blip r:embed="rId6">
+              <a:extLst>
+                <a:ext uri="{28A0092B-C50C-407E-A947-70E740481C1C}">
+                  <a14:useLocalDpi xmlns:a14="http://schemas.microsoft.com/office/drawing/2010/main" val="0"/>
+                </a:ext>
+                <a:ext uri="{96DAC541-7B7A-43D3-8B79-37D633B846F1}">
+                  <asvg:svgBlip xmlns:asvg="http://schemas.microsoft.com/office/drawing/2016/SVG/main" r:embed="rId7"/>
+                </a:ext>
+              </a:extLst>
+            </a:blip>
+            <a:stretch>
+              <a:fillRect/>
+            </a:stretch>
+          </p:blipFill>
+          <p:spPr>
+            <a:xfrm>
+              <a:off x="7517440" y="4986117"/>
+              <a:ext cx="1232393" cy="1095460"/>
+            </a:xfrm>
+            <a:prstGeom prst="rect">
+              <a:avLst/>
+            </a:prstGeom>
+          </p:spPr>
+        </p:pic>
+        <p:sp>
+          <p:nvSpPr>
+            <p:cNvPr id="24" name="TextBox 23">
+              <a:extLst>
+                <a:ext uri="{FF2B5EF4-FFF2-40B4-BE49-F238E27FC236}">
+                  <a16:creationId xmlns:a16="http://schemas.microsoft.com/office/drawing/2014/main" id="{E9F28818-DC8D-6A9E-B968-176F6858DD3D}"/>
+                </a:ext>
+              </a:extLst>
+            </p:cNvPr>
+            <p:cNvSpPr txBox="1"/>
+            <p:nvPr/>
+          </p:nvSpPr>
+          <p:spPr>
+            <a:xfrm>
+              <a:off x="6094177" y="4865331"/>
+              <a:ext cx="2194560" cy="640080"/>
+            </a:xfrm>
+            <a:prstGeom prst="rect">
+              <a:avLst/>
+            </a:prstGeom>
+            <a:noFill/>
+          </p:spPr>
+          <p:txBody>
+            <a:bodyPr wrap="square" rtlCol="0">
+              <a:spAutoFit/>
+            </a:bodyPr>
+            <a:lstStyle/>
+            <a:p>
+              <a:pPr algn="ctr"/>
+              <a:r>
+                <a:rPr lang="en-US" sz="3200" b="1" dirty="0">
+                  <a:ln w="12700">
+                    <a:solidFill>
+                      <a:schemeClr val="bg1"/>
+                    </a:solidFill>
+                    <a:prstDash val="solid"/>
+                  </a:ln>
+                  <a:solidFill>
+                    <a:schemeClr val="tx1">
+                      <a:lumMod val="85000"/>
+                      <a:lumOff val="15000"/>
+                    </a:schemeClr>
+                  </a:solidFill>
+                  <a:effectLst>
+                    <a:outerShdw dist="38100" dir="2640000" algn="bl" rotWithShape="0">
+                      <a:schemeClr val="tx2">
+                        <a:lumMod val="75000"/>
+                      </a:schemeClr>
+                    </a:outerShdw>
+                  </a:effectLst>
+                  <a:latin typeface="Amasis MT Pro Black" panose="02040A04050005020304" pitchFamily="18" charset="0"/>
+                </a:rPr>
+                <a:t>My Cabin</a:t>
+              </a:r>
+            </a:p>
+          </p:txBody>
+        </p:sp>
+      </p:grpSp>
+      <p:grpSp>
+        <p:nvGrpSpPr>
+          <p:cNvPr id="25" name="Group 24">
+            <a:extLst>
+              <a:ext uri="{FF2B5EF4-FFF2-40B4-BE49-F238E27FC236}">
+                <a16:creationId xmlns:a16="http://schemas.microsoft.com/office/drawing/2014/main" id="{D88E6BC4-2FEB-871D-02FA-941205E4C8EF}"/>
+              </a:ext>
+            </a:extLst>
+          </p:cNvPr>
+          <p:cNvGrpSpPr/>
+          <p:nvPr/>
+        </p:nvGrpSpPr>
+        <p:grpSpPr>
+          <a:xfrm>
+            <a:off x="941562" y="4007681"/>
+            <a:ext cx="3657600" cy="1407836"/>
+            <a:chOff x="932037" y="2557376"/>
+            <a:chExt cx="3657600" cy="1407836"/>
+          </a:xfrm>
+        </p:grpSpPr>
+        <p:pic>
+          <p:nvPicPr>
+            <p:cNvPr id="26" name="Graphic 25" descr="Cabin with solid fill">
+              <a:extLst>
+                <a:ext uri="{FF2B5EF4-FFF2-40B4-BE49-F238E27FC236}">
+                  <a16:creationId xmlns:a16="http://schemas.microsoft.com/office/drawing/2014/main" id="{D99204F9-EEB5-4443-456E-2C7FCDE86B9C}"/>
+                </a:ext>
+              </a:extLst>
+            </p:cNvPr>
+            <p:cNvPicPr>
+              <a:picLocks noChangeAspect="1"/>
+            </p:cNvPicPr>
+            <p:nvPr/>
+          </p:nvPicPr>
+          <p:blipFill rotWithShape="1">
+            <a:blip r:embed="rId8">
+              <a:extLst>
+                <a:ext uri="{28A0092B-C50C-407E-A947-70E740481C1C}">
+                  <a14:useLocalDpi xmlns:a14="http://schemas.microsoft.com/office/drawing/2010/main" val="0"/>
+                </a:ext>
+                <a:ext uri="{96DAC541-7B7A-43D3-8B79-37D633B846F1}">
+                  <asvg:svgBlip xmlns:asvg="http://schemas.microsoft.com/office/drawing/2016/SVG/main" r:embed="rId9"/>
+                </a:ext>
+              </a:extLst>
+            </a:blip>
+            <a:srcRect b="10588"/>
+            <a:stretch/>
+          </p:blipFill>
+          <p:spPr>
+            <a:xfrm>
+              <a:off x="2144641" y="2985746"/>
+              <a:ext cx="1232393" cy="979465"/>
+            </a:xfrm>
+            <a:prstGeom prst="rect">
+              <a:avLst/>
+            </a:prstGeom>
+          </p:spPr>
+        </p:pic>
+        <p:pic>
+          <p:nvPicPr>
+            <p:cNvPr id="27" name="Graphic 26" descr="Mountains outline">
+              <a:extLst>
+                <a:ext uri="{FF2B5EF4-FFF2-40B4-BE49-F238E27FC236}">
+                  <a16:creationId xmlns:a16="http://schemas.microsoft.com/office/drawing/2014/main" id="{6AEF33C7-B919-79D0-AD11-F55F789FAF92}"/>
+                </a:ext>
+              </a:extLst>
+            </p:cNvPr>
+            <p:cNvPicPr>
+              <a:picLocks noChangeAspect="1"/>
+            </p:cNvPicPr>
+            <p:nvPr/>
+          </p:nvPicPr>
+          <p:blipFill rotWithShape="1">
+            <a:blip r:embed="rId10">
+              <a:extLst>
+                <a:ext uri="{28A0092B-C50C-407E-A947-70E740481C1C}">
+                  <a14:useLocalDpi xmlns:a14="http://schemas.microsoft.com/office/drawing/2010/main" val="0"/>
+                </a:ext>
+                <a:ext uri="{96DAC541-7B7A-43D3-8B79-37D633B846F1}">
+                  <asvg:svgBlip xmlns:asvg="http://schemas.microsoft.com/office/drawing/2016/SVG/main" r:embed="rId11"/>
+                </a:ext>
+              </a:extLst>
+            </a:blip>
+            <a:srcRect t="19736" b="6343"/>
+            <a:stretch/>
+          </p:blipFill>
+          <p:spPr>
+            <a:xfrm>
+              <a:off x="932037" y="2613346"/>
+              <a:ext cx="3657600" cy="1351866"/>
+            </a:xfrm>
+            <a:prstGeom prst="rect">
+              <a:avLst/>
+            </a:prstGeom>
+          </p:spPr>
+        </p:pic>
+        <p:pic>
+          <p:nvPicPr>
+            <p:cNvPr id="28" name="Graphic 27" descr="Forest scene with solid fill">
+              <a:extLst>
+                <a:ext uri="{FF2B5EF4-FFF2-40B4-BE49-F238E27FC236}">
+                  <a16:creationId xmlns:a16="http://schemas.microsoft.com/office/drawing/2014/main" id="{80A0F7A7-B8DA-632E-397C-77684545C2A5}"/>
+                </a:ext>
+              </a:extLst>
+            </p:cNvPr>
+            <p:cNvPicPr>
+              <a:picLocks noChangeAspect="1"/>
+            </p:cNvPicPr>
+            <p:nvPr/>
+          </p:nvPicPr>
+          <p:blipFill>
+            <a:blip r:embed="rId12">
+              <a:extLst>
+                <a:ext uri="{28A0092B-C50C-407E-A947-70E740481C1C}">
+                  <a14:useLocalDpi xmlns:a14="http://schemas.microsoft.com/office/drawing/2010/main" val="0"/>
+                </a:ext>
+                <a:ext uri="{96DAC541-7B7A-43D3-8B79-37D633B846F1}">
+                  <asvg:svgBlip xmlns:asvg="http://schemas.microsoft.com/office/drawing/2016/SVG/main" r:embed="rId13"/>
+                </a:ext>
+              </a:extLst>
+            </a:blip>
+            <a:stretch>
+              <a:fillRect/>
+            </a:stretch>
+          </p:blipFill>
+          <p:spPr>
+            <a:xfrm>
+              <a:off x="1124911" y="2714405"/>
+              <a:ext cx="1232393" cy="1095460"/>
+            </a:xfrm>
+            <a:prstGeom prst="rect">
+              <a:avLst/>
+            </a:prstGeom>
+          </p:spPr>
+        </p:pic>
+        <p:pic>
+          <p:nvPicPr>
+            <p:cNvPr id="29" name="Graphic 28" descr="Forest scene with solid fill">
+              <a:extLst>
+                <a:ext uri="{FF2B5EF4-FFF2-40B4-BE49-F238E27FC236}">
+                  <a16:creationId xmlns:a16="http://schemas.microsoft.com/office/drawing/2014/main" id="{E26F0759-6EE7-2CC7-8926-9002E11FF3A8}"/>
+                </a:ext>
+              </a:extLst>
+            </p:cNvPr>
+            <p:cNvPicPr>
+              <a:picLocks noChangeAspect="1"/>
+            </p:cNvPicPr>
+            <p:nvPr/>
+          </p:nvPicPr>
+          <p:blipFill>
+            <a:blip r:embed="rId12">
+              <a:extLst>
+                <a:ext uri="{28A0092B-C50C-407E-A947-70E740481C1C}">
+                  <a14:useLocalDpi xmlns:a14="http://schemas.microsoft.com/office/drawing/2010/main" val="0"/>
+                </a:ext>
+                <a:ext uri="{96DAC541-7B7A-43D3-8B79-37D633B846F1}">
+                  <asvg:svgBlip xmlns:asvg="http://schemas.microsoft.com/office/drawing/2016/SVG/main" r:embed="rId13"/>
+                </a:ext>
+              </a:extLst>
+            </a:blip>
+            <a:stretch>
+              <a:fillRect/>
+            </a:stretch>
+          </p:blipFill>
+          <p:spPr>
+            <a:xfrm>
+              <a:off x="3164370" y="2714405"/>
+              <a:ext cx="1232393" cy="1095460"/>
+            </a:xfrm>
+            <a:prstGeom prst="rect">
+              <a:avLst/>
+            </a:prstGeom>
+          </p:spPr>
+        </p:pic>
+        <p:sp>
+          <p:nvSpPr>
+            <p:cNvPr id="31" name="TextBox 30">
+              <a:extLst>
+                <a:ext uri="{FF2B5EF4-FFF2-40B4-BE49-F238E27FC236}">
+                  <a16:creationId xmlns:a16="http://schemas.microsoft.com/office/drawing/2014/main" id="{0FBC1469-E32B-D0C6-E81E-6CFEA3A85565}"/>
+                </a:ext>
+              </a:extLst>
+            </p:cNvPr>
+            <p:cNvSpPr txBox="1"/>
+            <p:nvPr/>
+          </p:nvSpPr>
+          <p:spPr>
+            <a:xfrm>
+              <a:off x="1737943" y="2557376"/>
+              <a:ext cx="2194560" cy="640080"/>
+            </a:xfrm>
+            <a:prstGeom prst="rect">
+              <a:avLst/>
+            </a:prstGeom>
+            <a:noFill/>
+          </p:spPr>
+          <p:txBody>
+            <a:bodyPr wrap="square" rtlCol="0">
+              <a:spAutoFit/>
+            </a:bodyPr>
+            <a:lstStyle/>
+            <a:p>
+              <a:pPr algn="ctr"/>
+              <a:r>
+                <a:rPr lang="en-US" sz="3200" b="1" dirty="0">
+                  <a:ln w="12700">
+                    <a:solidFill>
+                      <a:schemeClr val="tx1">
+                        <a:lumMod val="85000"/>
+                        <a:lumOff val="15000"/>
+                      </a:schemeClr>
+                    </a:solidFill>
+                    <a:prstDash val="solid"/>
+                  </a:ln>
+                  <a:solidFill>
+                    <a:schemeClr val="bg1"/>
+                  </a:solidFill>
+                  <a:effectLst>
+                    <a:outerShdw dist="38100" dir="2640000" algn="bl" rotWithShape="0">
+                      <a:schemeClr val="tx2">
+                        <a:lumMod val="75000"/>
+                      </a:schemeClr>
+                    </a:outerShdw>
+                  </a:effectLst>
+                  <a:latin typeface="Amasis MT Pro Black" panose="02040A04050005020304" pitchFamily="18" charset="0"/>
+                </a:rPr>
+                <a:t>My Cabin</a:t>
+              </a:r>
+            </a:p>
+          </p:txBody>
+        </p:sp>
+      </p:grpSp>
     </p:spTree>
     <p:extLst>
       <p:ext uri="{BB962C8B-B14F-4D97-AF65-F5344CB8AC3E}">
         <p14:creationId xmlns:p14="http://schemas.microsoft.com/office/powerpoint/2010/main" val="1588781023"/>
+      </p:ext>
+    </p:extLst>
+  </p:cSld>
+  <p:clrMapOvr>
+    <a:masterClrMapping/>
+  </p:clrMapOvr>
+</p:sld>
+</file>
+
+<file path=ppt/slides/slide8.xml><?xml version="1.0" encoding="utf-8"?>
+<p:sld xmlns:a="http://schemas.openxmlformats.org/drawingml/2006/main" xmlns:r="http://schemas.openxmlformats.org/officeDocument/2006/relationships" xmlns:p="http://schemas.openxmlformats.org/presentationml/2006/main">
+  <p:cSld>
+    <p:spTree>
+      <p:nvGrpSpPr>
+        <p:cNvPr id="1" name=""/>
+        <p:cNvGrpSpPr/>
+        <p:nvPr/>
+      </p:nvGrpSpPr>
+      <p:grpSpPr>
+        <a:xfrm>
+          <a:off x="0" y="0"/>
+          <a:ext cx="0" cy="0"/>
+          <a:chOff x="0" y="0"/>
+          <a:chExt cx="0" cy="0"/>
+        </a:xfrm>
+      </p:grpSpPr>
+      <p:sp>
+        <p:nvSpPr>
+          <p:cNvPr id="10" name="Rectangle 9">
+            <a:extLst>
+              <a:ext uri="{FF2B5EF4-FFF2-40B4-BE49-F238E27FC236}">
+                <a16:creationId xmlns:a16="http://schemas.microsoft.com/office/drawing/2014/main" id="{E20F74CB-0563-923A-B99C-ED7845C32451}"/>
+              </a:ext>
+            </a:extLst>
+          </p:cNvPr>
+          <p:cNvSpPr/>
+          <p:nvPr/>
+        </p:nvSpPr>
+        <p:spPr>
+          <a:xfrm>
+            <a:off x="5241075" y="825676"/>
+            <a:ext cx="3959227" cy="2337063"/>
+          </a:xfrm>
+          <a:prstGeom prst="rect">
+            <a:avLst/>
+          </a:prstGeom>
+          <a:solidFill>
+            <a:schemeClr val="tx1"/>
+          </a:solidFill>
+        </p:spPr>
+        <p:style>
+          <a:lnRef idx="2">
+            <a:schemeClr val="accent1">
+              <a:shade val="15000"/>
+            </a:schemeClr>
+          </a:lnRef>
+          <a:fillRef idx="1">
+            <a:schemeClr val="accent1"/>
+          </a:fillRef>
+          <a:effectRef idx="0">
+            <a:schemeClr val="accent1"/>
+          </a:effectRef>
+          <a:fontRef idx="minor">
+            <a:schemeClr val="lt1"/>
+          </a:fontRef>
+        </p:style>
+        <p:txBody>
+          <a:bodyPr rtlCol="0" anchor="ctr"/>
+          <a:lstStyle/>
+          <a:p>
+            <a:pPr algn="ctr"/>
+            <a:endParaRPr lang="en-US" dirty="0"/>
+          </a:p>
+        </p:txBody>
+      </p:sp>
+      <p:grpSp>
+        <p:nvGrpSpPr>
+          <p:cNvPr id="11" name="Group 10">
+            <a:extLst>
+              <a:ext uri="{FF2B5EF4-FFF2-40B4-BE49-F238E27FC236}">
+                <a16:creationId xmlns:a16="http://schemas.microsoft.com/office/drawing/2014/main" id="{6915A286-57B9-F26F-2922-12AB2E9738F1}"/>
+              </a:ext>
+            </a:extLst>
+          </p:cNvPr>
+          <p:cNvGrpSpPr/>
+          <p:nvPr/>
+        </p:nvGrpSpPr>
+        <p:grpSpPr>
+          <a:xfrm>
+            <a:off x="5508530" y="1418746"/>
+            <a:ext cx="3657600" cy="1351866"/>
+            <a:chOff x="5285107" y="4885058"/>
+            <a:chExt cx="3657600" cy="1351866"/>
+          </a:xfrm>
+        </p:grpSpPr>
+        <p:pic>
+          <p:nvPicPr>
+            <p:cNvPr id="19" name="Graphic 18" descr="Cabin with solid fill">
+              <a:extLst>
+                <a:ext uri="{FF2B5EF4-FFF2-40B4-BE49-F238E27FC236}">
+                  <a16:creationId xmlns:a16="http://schemas.microsoft.com/office/drawing/2014/main" id="{93E880A0-A362-9BCB-68C7-6AA6401B9CC7}"/>
+                </a:ext>
+              </a:extLst>
+            </p:cNvPr>
+            <p:cNvPicPr>
+              <a:picLocks noChangeAspect="1"/>
+            </p:cNvPicPr>
+            <p:nvPr/>
+          </p:nvPicPr>
+          <p:blipFill rotWithShape="1">
+            <a:blip r:embed="rId2">
+              <a:extLst>
+                <a:ext uri="{28A0092B-C50C-407E-A947-70E740481C1C}">
+                  <a14:useLocalDpi xmlns:a14="http://schemas.microsoft.com/office/drawing/2010/main" val="0"/>
+                </a:ext>
+                <a:ext uri="{96DAC541-7B7A-43D3-8B79-37D633B846F1}">
+                  <asvg:svgBlip xmlns:asvg="http://schemas.microsoft.com/office/drawing/2016/SVG/main" r:embed="rId3"/>
+                </a:ext>
+              </a:extLst>
+            </a:blip>
+            <a:srcRect b="10588"/>
+            <a:stretch/>
+          </p:blipFill>
+          <p:spPr>
+            <a:xfrm>
+              <a:off x="6497711" y="5257458"/>
+              <a:ext cx="1232393" cy="979465"/>
+            </a:xfrm>
+            <a:prstGeom prst="rect">
+              <a:avLst/>
+            </a:prstGeom>
+          </p:spPr>
+        </p:pic>
+        <p:pic>
+          <p:nvPicPr>
+            <p:cNvPr id="20" name="Graphic 19" descr="Mountains outline">
+              <a:extLst>
+                <a:ext uri="{FF2B5EF4-FFF2-40B4-BE49-F238E27FC236}">
+                  <a16:creationId xmlns:a16="http://schemas.microsoft.com/office/drawing/2014/main" id="{ABE4AFFD-95AC-8C39-E4A2-245827425CAF}"/>
+                </a:ext>
+              </a:extLst>
+            </p:cNvPr>
+            <p:cNvPicPr>
+              <a:picLocks noChangeAspect="1"/>
+            </p:cNvPicPr>
+            <p:nvPr/>
+          </p:nvPicPr>
+          <p:blipFill rotWithShape="1">
+            <a:blip r:embed="rId4">
+              <a:extLst>
+                <a:ext uri="{28A0092B-C50C-407E-A947-70E740481C1C}">
+                  <a14:useLocalDpi xmlns:a14="http://schemas.microsoft.com/office/drawing/2010/main" val="0"/>
+                </a:ext>
+                <a:ext uri="{96DAC541-7B7A-43D3-8B79-37D633B846F1}">
+                  <asvg:svgBlip xmlns:asvg="http://schemas.microsoft.com/office/drawing/2016/SVG/main" r:embed="rId5"/>
+                </a:ext>
+              </a:extLst>
+            </a:blip>
+            <a:srcRect t="19736" b="6343"/>
+            <a:stretch/>
+          </p:blipFill>
+          <p:spPr>
+            <a:xfrm>
+              <a:off x="5285107" y="4885058"/>
+              <a:ext cx="3657600" cy="1351866"/>
+            </a:xfrm>
+            <a:prstGeom prst="rect">
+              <a:avLst/>
+            </a:prstGeom>
+          </p:spPr>
+        </p:pic>
+        <p:pic>
+          <p:nvPicPr>
+            <p:cNvPr id="21" name="Graphic 20" descr="Forest scene with solid fill">
+              <a:extLst>
+                <a:ext uri="{FF2B5EF4-FFF2-40B4-BE49-F238E27FC236}">
+                  <a16:creationId xmlns:a16="http://schemas.microsoft.com/office/drawing/2014/main" id="{F7D3357E-48F7-D96A-E947-5675889472EA}"/>
+                </a:ext>
+              </a:extLst>
+            </p:cNvPr>
+            <p:cNvPicPr>
+              <a:picLocks noChangeAspect="1"/>
+            </p:cNvPicPr>
+            <p:nvPr/>
+          </p:nvPicPr>
+          <p:blipFill>
+            <a:blip r:embed="rId6">
+              <a:extLst>
+                <a:ext uri="{28A0092B-C50C-407E-A947-70E740481C1C}">
+                  <a14:useLocalDpi xmlns:a14="http://schemas.microsoft.com/office/drawing/2010/main" val="0"/>
+                </a:ext>
+                <a:ext uri="{96DAC541-7B7A-43D3-8B79-37D633B846F1}">
+                  <asvg:svgBlip xmlns:asvg="http://schemas.microsoft.com/office/drawing/2016/SVG/main" r:embed="rId7"/>
+                </a:ext>
+              </a:extLst>
+            </a:blip>
+            <a:stretch>
+              <a:fillRect/>
+            </a:stretch>
+          </p:blipFill>
+          <p:spPr>
+            <a:xfrm>
+              <a:off x="5477981" y="4986117"/>
+              <a:ext cx="1232393" cy="1095460"/>
+            </a:xfrm>
+            <a:prstGeom prst="rect">
+              <a:avLst/>
+            </a:prstGeom>
+          </p:spPr>
+        </p:pic>
+        <p:pic>
+          <p:nvPicPr>
+            <p:cNvPr id="22" name="Graphic 21" descr="Forest scene with solid fill">
+              <a:extLst>
+                <a:ext uri="{FF2B5EF4-FFF2-40B4-BE49-F238E27FC236}">
+                  <a16:creationId xmlns:a16="http://schemas.microsoft.com/office/drawing/2014/main" id="{D19170E7-96A4-1231-C299-9AB21D61DD00}"/>
+                </a:ext>
+              </a:extLst>
+            </p:cNvPr>
+            <p:cNvPicPr>
+              <a:picLocks noChangeAspect="1"/>
+            </p:cNvPicPr>
+            <p:nvPr/>
+          </p:nvPicPr>
+          <p:blipFill>
+            <a:blip r:embed="rId6">
+              <a:extLst>
+                <a:ext uri="{28A0092B-C50C-407E-A947-70E740481C1C}">
+                  <a14:useLocalDpi xmlns:a14="http://schemas.microsoft.com/office/drawing/2010/main" val="0"/>
+                </a:ext>
+                <a:ext uri="{96DAC541-7B7A-43D3-8B79-37D633B846F1}">
+                  <asvg:svgBlip xmlns:asvg="http://schemas.microsoft.com/office/drawing/2016/SVG/main" r:embed="rId7"/>
+                </a:ext>
+              </a:extLst>
+            </a:blip>
+            <a:stretch>
+              <a:fillRect/>
+            </a:stretch>
+          </p:blipFill>
+          <p:spPr>
+            <a:xfrm>
+              <a:off x="7517440" y="4986117"/>
+              <a:ext cx="1232393" cy="1095460"/>
+            </a:xfrm>
+            <a:prstGeom prst="rect">
+              <a:avLst/>
+            </a:prstGeom>
+          </p:spPr>
+        </p:pic>
+      </p:grpSp>
+      <p:grpSp>
+        <p:nvGrpSpPr>
+          <p:cNvPr id="25" name="Group 24">
+            <a:extLst>
+              <a:ext uri="{FF2B5EF4-FFF2-40B4-BE49-F238E27FC236}">
+                <a16:creationId xmlns:a16="http://schemas.microsoft.com/office/drawing/2014/main" id="{D88E6BC4-2FEB-871D-02FA-941205E4C8EF}"/>
+              </a:ext>
+            </a:extLst>
+          </p:cNvPr>
+          <p:cNvGrpSpPr/>
+          <p:nvPr/>
+        </p:nvGrpSpPr>
+        <p:grpSpPr>
+          <a:xfrm>
+            <a:off x="941562" y="1410098"/>
+            <a:ext cx="3657600" cy="1351866"/>
+            <a:chOff x="932037" y="2613346"/>
+            <a:chExt cx="3657600" cy="1351866"/>
+          </a:xfrm>
+        </p:grpSpPr>
+        <p:pic>
+          <p:nvPicPr>
+            <p:cNvPr id="26" name="Graphic 25" descr="Cabin with solid fill">
+              <a:extLst>
+                <a:ext uri="{FF2B5EF4-FFF2-40B4-BE49-F238E27FC236}">
+                  <a16:creationId xmlns:a16="http://schemas.microsoft.com/office/drawing/2014/main" id="{D99204F9-EEB5-4443-456E-2C7FCDE86B9C}"/>
+                </a:ext>
+              </a:extLst>
+            </p:cNvPr>
+            <p:cNvPicPr>
+              <a:picLocks noChangeAspect="1"/>
+            </p:cNvPicPr>
+            <p:nvPr/>
+          </p:nvPicPr>
+          <p:blipFill rotWithShape="1">
+            <a:blip r:embed="rId8">
+              <a:extLst>
+                <a:ext uri="{28A0092B-C50C-407E-A947-70E740481C1C}">
+                  <a14:useLocalDpi xmlns:a14="http://schemas.microsoft.com/office/drawing/2010/main" val="0"/>
+                </a:ext>
+                <a:ext uri="{96DAC541-7B7A-43D3-8B79-37D633B846F1}">
+                  <asvg:svgBlip xmlns:asvg="http://schemas.microsoft.com/office/drawing/2016/SVG/main" r:embed="rId9"/>
+                </a:ext>
+              </a:extLst>
+            </a:blip>
+            <a:srcRect b="10588"/>
+            <a:stretch/>
+          </p:blipFill>
+          <p:spPr>
+            <a:xfrm>
+              <a:off x="2144641" y="2985746"/>
+              <a:ext cx="1232393" cy="979465"/>
+            </a:xfrm>
+            <a:prstGeom prst="rect">
+              <a:avLst/>
+            </a:prstGeom>
+          </p:spPr>
+        </p:pic>
+        <p:pic>
+          <p:nvPicPr>
+            <p:cNvPr id="27" name="Graphic 26" descr="Mountains outline">
+              <a:extLst>
+                <a:ext uri="{FF2B5EF4-FFF2-40B4-BE49-F238E27FC236}">
+                  <a16:creationId xmlns:a16="http://schemas.microsoft.com/office/drawing/2014/main" id="{6AEF33C7-B919-79D0-AD11-F55F789FAF92}"/>
+                </a:ext>
+              </a:extLst>
+            </p:cNvPr>
+            <p:cNvPicPr>
+              <a:picLocks noChangeAspect="1"/>
+            </p:cNvPicPr>
+            <p:nvPr/>
+          </p:nvPicPr>
+          <p:blipFill rotWithShape="1">
+            <a:blip r:embed="rId10">
+              <a:extLst>
+                <a:ext uri="{28A0092B-C50C-407E-A947-70E740481C1C}">
+                  <a14:useLocalDpi xmlns:a14="http://schemas.microsoft.com/office/drawing/2010/main" val="0"/>
+                </a:ext>
+                <a:ext uri="{96DAC541-7B7A-43D3-8B79-37D633B846F1}">
+                  <asvg:svgBlip xmlns:asvg="http://schemas.microsoft.com/office/drawing/2016/SVG/main" r:embed="rId11"/>
+                </a:ext>
+              </a:extLst>
+            </a:blip>
+            <a:srcRect t="19736" b="6343"/>
+            <a:stretch/>
+          </p:blipFill>
+          <p:spPr>
+            <a:xfrm>
+              <a:off x="932037" y="2613346"/>
+              <a:ext cx="3657600" cy="1351866"/>
+            </a:xfrm>
+            <a:prstGeom prst="rect">
+              <a:avLst/>
+            </a:prstGeom>
+          </p:spPr>
+        </p:pic>
+        <p:pic>
+          <p:nvPicPr>
+            <p:cNvPr id="28" name="Graphic 27" descr="Forest scene with solid fill">
+              <a:extLst>
+                <a:ext uri="{FF2B5EF4-FFF2-40B4-BE49-F238E27FC236}">
+                  <a16:creationId xmlns:a16="http://schemas.microsoft.com/office/drawing/2014/main" id="{80A0F7A7-B8DA-632E-397C-77684545C2A5}"/>
+                </a:ext>
+              </a:extLst>
+            </p:cNvPr>
+            <p:cNvPicPr>
+              <a:picLocks noChangeAspect="1"/>
+            </p:cNvPicPr>
+            <p:nvPr/>
+          </p:nvPicPr>
+          <p:blipFill>
+            <a:blip r:embed="rId12">
+              <a:extLst>
+                <a:ext uri="{28A0092B-C50C-407E-A947-70E740481C1C}">
+                  <a14:useLocalDpi xmlns:a14="http://schemas.microsoft.com/office/drawing/2010/main" val="0"/>
+                </a:ext>
+                <a:ext uri="{96DAC541-7B7A-43D3-8B79-37D633B846F1}">
+                  <asvg:svgBlip xmlns:asvg="http://schemas.microsoft.com/office/drawing/2016/SVG/main" r:embed="rId13"/>
+                </a:ext>
+              </a:extLst>
+            </a:blip>
+            <a:stretch>
+              <a:fillRect/>
+            </a:stretch>
+          </p:blipFill>
+          <p:spPr>
+            <a:xfrm>
+              <a:off x="1124911" y="2714405"/>
+              <a:ext cx="1232393" cy="1095460"/>
+            </a:xfrm>
+            <a:prstGeom prst="rect">
+              <a:avLst/>
+            </a:prstGeom>
+          </p:spPr>
+        </p:pic>
+        <p:pic>
+          <p:nvPicPr>
+            <p:cNvPr id="29" name="Graphic 28" descr="Forest scene with solid fill">
+              <a:extLst>
+                <a:ext uri="{FF2B5EF4-FFF2-40B4-BE49-F238E27FC236}">
+                  <a16:creationId xmlns:a16="http://schemas.microsoft.com/office/drawing/2014/main" id="{E26F0759-6EE7-2CC7-8926-9002E11FF3A8}"/>
+                </a:ext>
+              </a:extLst>
+            </p:cNvPr>
+            <p:cNvPicPr>
+              <a:picLocks noChangeAspect="1"/>
+            </p:cNvPicPr>
+            <p:nvPr/>
+          </p:nvPicPr>
+          <p:blipFill>
+            <a:blip r:embed="rId12">
+              <a:extLst>
+                <a:ext uri="{28A0092B-C50C-407E-A947-70E740481C1C}">
+                  <a14:useLocalDpi xmlns:a14="http://schemas.microsoft.com/office/drawing/2010/main" val="0"/>
+                </a:ext>
+                <a:ext uri="{96DAC541-7B7A-43D3-8B79-37D633B846F1}">
+                  <asvg:svgBlip xmlns:asvg="http://schemas.microsoft.com/office/drawing/2016/SVG/main" r:embed="rId13"/>
+                </a:ext>
+              </a:extLst>
+            </a:blip>
+            <a:stretch>
+              <a:fillRect/>
+            </a:stretch>
+          </p:blipFill>
+          <p:spPr>
+            <a:xfrm>
+              <a:off x="3164370" y="2714405"/>
+              <a:ext cx="1232393" cy="1095460"/>
+            </a:xfrm>
+            <a:prstGeom prst="rect">
+              <a:avLst/>
+            </a:prstGeom>
+          </p:spPr>
+        </p:pic>
+      </p:grpSp>
+      <p:pic>
+        <p:nvPicPr>
+          <p:cNvPr id="23" name="Graphic 22" descr="Cabin with solid fill">
+            <a:extLst>
+              <a:ext uri="{FF2B5EF4-FFF2-40B4-BE49-F238E27FC236}">
+                <a16:creationId xmlns:a16="http://schemas.microsoft.com/office/drawing/2014/main" id="{BDB691B7-3642-589E-FF31-F405032A54A4}"/>
+              </a:ext>
+            </a:extLst>
+          </p:cNvPr>
+          <p:cNvPicPr>
+            <a:picLocks noChangeAspect="1"/>
+          </p:cNvPicPr>
+          <p:nvPr/>
+        </p:nvPicPr>
+        <p:blipFill rotWithShape="1">
+          <a:blip r:embed="rId8">
+            <a:extLst>
+              <a:ext uri="{28A0092B-C50C-407E-A947-70E740481C1C}">
+                <a14:useLocalDpi xmlns:a14="http://schemas.microsoft.com/office/drawing/2010/main" val="0"/>
+              </a:ext>
+              <a:ext uri="{96DAC541-7B7A-43D3-8B79-37D633B846F1}">
+                <asvg:svgBlip xmlns:asvg="http://schemas.microsoft.com/office/drawing/2016/SVG/main" r:embed="rId9"/>
+              </a:ext>
+            </a:extLst>
+          </a:blip>
+          <a:srcRect b="10588"/>
+          <a:stretch/>
+        </p:blipFill>
+        <p:spPr>
+          <a:xfrm>
+            <a:off x="9629164" y="4059541"/>
+            <a:ext cx="1232393" cy="979465"/>
+          </a:xfrm>
+          <a:prstGeom prst="rect">
+            <a:avLst/>
+          </a:prstGeom>
+        </p:spPr>
+      </p:pic>
+      <p:sp>
+        <p:nvSpPr>
+          <p:cNvPr id="30" name="Rectangle 29">
+            <a:extLst>
+              <a:ext uri="{FF2B5EF4-FFF2-40B4-BE49-F238E27FC236}">
+                <a16:creationId xmlns:a16="http://schemas.microsoft.com/office/drawing/2014/main" id="{288D5083-8B79-77E9-7302-019EC29B8896}"/>
+              </a:ext>
+            </a:extLst>
+          </p:cNvPr>
+          <p:cNvSpPr/>
+          <p:nvPr/>
+        </p:nvSpPr>
+        <p:spPr>
+          <a:xfrm>
+            <a:off x="5218381" y="3429000"/>
+            <a:ext cx="3959227" cy="2337063"/>
+          </a:xfrm>
+          <a:prstGeom prst="rect">
+            <a:avLst/>
+          </a:prstGeom>
+          <a:solidFill>
+            <a:schemeClr val="tx1"/>
+          </a:solidFill>
+        </p:spPr>
+        <p:style>
+          <a:lnRef idx="2">
+            <a:schemeClr val="accent1">
+              <a:shade val="15000"/>
+            </a:schemeClr>
+          </a:lnRef>
+          <a:fillRef idx="1">
+            <a:schemeClr val="accent1"/>
+          </a:fillRef>
+          <a:effectRef idx="0">
+            <a:schemeClr val="accent1"/>
+          </a:effectRef>
+          <a:fontRef idx="minor">
+            <a:schemeClr val="lt1"/>
+          </a:fontRef>
+        </p:style>
+        <p:txBody>
+          <a:bodyPr rtlCol="0" anchor="ctr"/>
+          <a:lstStyle/>
+          <a:p>
+            <a:pPr algn="ctr"/>
+            <a:endParaRPr lang="en-US" dirty="0"/>
+          </a:p>
+        </p:txBody>
+      </p:sp>
+      <p:pic>
+        <p:nvPicPr>
+          <p:cNvPr id="32" name="Graphic 31" descr="Cabin with solid fill">
+            <a:extLst>
+              <a:ext uri="{FF2B5EF4-FFF2-40B4-BE49-F238E27FC236}">
+                <a16:creationId xmlns:a16="http://schemas.microsoft.com/office/drawing/2014/main" id="{A4922C66-156A-F1CD-8D63-2508B03872C6}"/>
+              </a:ext>
+            </a:extLst>
+          </p:cNvPr>
+          <p:cNvPicPr>
+            <a:picLocks noChangeAspect="1"/>
+          </p:cNvPicPr>
+          <p:nvPr/>
+        </p:nvPicPr>
+        <p:blipFill rotWithShape="1">
+          <a:blip r:embed="rId2">
+            <a:extLst>
+              <a:ext uri="{28A0092B-C50C-407E-A947-70E740481C1C}">
+                <a14:useLocalDpi xmlns:a14="http://schemas.microsoft.com/office/drawing/2010/main" val="0"/>
+              </a:ext>
+              <a:ext uri="{96DAC541-7B7A-43D3-8B79-37D633B846F1}">
+                <asvg:svgBlip xmlns:asvg="http://schemas.microsoft.com/office/drawing/2016/SVG/main" r:embed="rId3"/>
+              </a:ext>
+            </a:extLst>
+          </a:blip>
+          <a:srcRect b="10588"/>
+          <a:stretch/>
+        </p:blipFill>
+        <p:spPr>
+          <a:xfrm>
+            <a:off x="6604491" y="4107798"/>
+            <a:ext cx="1232393" cy="979465"/>
+          </a:xfrm>
+          <a:prstGeom prst="rect">
+            <a:avLst/>
+          </a:prstGeom>
+        </p:spPr>
+      </p:pic>
+      <p:grpSp>
+        <p:nvGrpSpPr>
+          <p:cNvPr id="2" name="Group 1">
+            <a:extLst>
+              <a:ext uri="{FF2B5EF4-FFF2-40B4-BE49-F238E27FC236}">
+                <a16:creationId xmlns:a16="http://schemas.microsoft.com/office/drawing/2014/main" id="{3369FD79-23C9-15E9-A545-2B473CFB33C6}"/>
+              </a:ext>
+            </a:extLst>
+          </p:cNvPr>
+          <p:cNvGrpSpPr/>
+          <p:nvPr/>
+        </p:nvGrpSpPr>
+        <p:grpSpPr>
+          <a:xfrm>
+            <a:off x="867726" y="3873340"/>
+            <a:ext cx="3657600" cy="1351866"/>
+            <a:chOff x="932037" y="2613346"/>
+            <a:chExt cx="3657600" cy="1351866"/>
+          </a:xfrm>
+        </p:grpSpPr>
+        <p:pic>
+          <p:nvPicPr>
+            <p:cNvPr id="3" name="Graphic 2" descr="Cabin with solid fill">
+              <a:extLst>
+                <a:ext uri="{FF2B5EF4-FFF2-40B4-BE49-F238E27FC236}">
+                  <a16:creationId xmlns:a16="http://schemas.microsoft.com/office/drawing/2014/main" id="{67EFCA91-0112-48BE-3B6D-E6BB2BCDFC53}"/>
+                </a:ext>
+              </a:extLst>
+            </p:cNvPr>
+            <p:cNvPicPr>
+              <a:picLocks noChangeAspect="1"/>
+            </p:cNvPicPr>
+            <p:nvPr/>
+          </p:nvPicPr>
+          <p:blipFill rotWithShape="1">
+            <a:blip r:embed="rId14">
+              <a:extLst>
+                <a:ext uri="{28A0092B-C50C-407E-A947-70E740481C1C}">
+                  <a14:useLocalDpi xmlns:a14="http://schemas.microsoft.com/office/drawing/2010/main" val="0"/>
+                </a:ext>
+                <a:ext uri="{96DAC541-7B7A-43D3-8B79-37D633B846F1}">
+                  <asvg:svgBlip xmlns:asvg="http://schemas.microsoft.com/office/drawing/2016/SVG/main" r:embed="rId15"/>
+                </a:ext>
+              </a:extLst>
+            </a:blip>
+            <a:srcRect b="10588"/>
+            <a:stretch/>
+          </p:blipFill>
+          <p:spPr>
+            <a:xfrm>
+              <a:off x="2144641" y="2985746"/>
+              <a:ext cx="1232393" cy="979465"/>
+            </a:xfrm>
+            <a:prstGeom prst="rect">
+              <a:avLst/>
+            </a:prstGeom>
+          </p:spPr>
+        </p:pic>
+        <p:pic>
+          <p:nvPicPr>
+            <p:cNvPr id="4" name="Graphic 3" descr="Mountains outline">
+              <a:extLst>
+                <a:ext uri="{FF2B5EF4-FFF2-40B4-BE49-F238E27FC236}">
+                  <a16:creationId xmlns:a16="http://schemas.microsoft.com/office/drawing/2014/main" id="{D3358FF0-5683-92AE-8045-3AF073A14094}"/>
+                </a:ext>
+              </a:extLst>
+            </p:cNvPr>
+            <p:cNvPicPr>
+              <a:picLocks noChangeAspect="1"/>
+            </p:cNvPicPr>
+            <p:nvPr/>
+          </p:nvPicPr>
+          <p:blipFill rotWithShape="1">
+            <a:blip r:embed="rId16">
+              <a:extLst>
+                <a:ext uri="{28A0092B-C50C-407E-A947-70E740481C1C}">
+                  <a14:useLocalDpi xmlns:a14="http://schemas.microsoft.com/office/drawing/2010/main" val="0"/>
+                </a:ext>
+                <a:ext uri="{96DAC541-7B7A-43D3-8B79-37D633B846F1}">
+                  <asvg:svgBlip xmlns:asvg="http://schemas.microsoft.com/office/drawing/2016/SVG/main" r:embed="rId17"/>
+                </a:ext>
+              </a:extLst>
+            </a:blip>
+            <a:srcRect t="19736" b="6343"/>
+            <a:stretch/>
+          </p:blipFill>
+          <p:spPr>
+            <a:xfrm>
+              <a:off x="932037" y="2613346"/>
+              <a:ext cx="3657600" cy="1351866"/>
+            </a:xfrm>
+            <a:prstGeom prst="rect">
+              <a:avLst/>
+            </a:prstGeom>
+          </p:spPr>
+        </p:pic>
+        <p:pic>
+          <p:nvPicPr>
+            <p:cNvPr id="5" name="Graphic 4" descr="Forest scene with solid fill">
+              <a:extLst>
+                <a:ext uri="{FF2B5EF4-FFF2-40B4-BE49-F238E27FC236}">
+                  <a16:creationId xmlns:a16="http://schemas.microsoft.com/office/drawing/2014/main" id="{252ED85C-BF06-8FC9-953B-D366CB7D2EF4}"/>
+                </a:ext>
+              </a:extLst>
+            </p:cNvPr>
+            <p:cNvPicPr>
+              <a:picLocks noChangeAspect="1"/>
+            </p:cNvPicPr>
+            <p:nvPr/>
+          </p:nvPicPr>
+          <p:blipFill>
+            <a:blip r:embed="rId18">
+              <a:extLst>
+                <a:ext uri="{28A0092B-C50C-407E-A947-70E740481C1C}">
+                  <a14:useLocalDpi xmlns:a14="http://schemas.microsoft.com/office/drawing/2010/main" val="0"/>
+                </a:ext>
+                <a:ext uri="{96DAC541-7B7A-43D3-8B79-37D633B846F1}">
+                  <asvg:svgBlip xmlns:asvg="http://schemas.microsoft.com/office/drawing/2016/SVG/main" r:embed="rId19"/>
+                </a:ext>
+              </a:extLst>
+            </a:blip>
+            <a:stretch>
+              <a:fillRect/>
+            </a:stretch>
+          </p:blipFill>
+          <p:spPr>
+            <a:xfrm>
+              <a:off x="1124911" y="2714405"/>
+              <a:ext cx="1232393" cy="1095460"/>
+            </a:xfrm>
+            <a:prstGeom prst="rect">
+              <a:avLst/>
+            </a:prstGeom>
+          </p:spPr>
+        </p:pic>
+        <p:pic>
+          <p:nvPicPr>
+            <p:cNvPr id="6" name="Graphic 5" descr="Forest scene with solid fill">
+              <a:extLst>
+                <a:ext uri="{FF2B5EF4-FFF2-40B4-BE49-F238E27FC236}">
+                  <a16:creationId xmlns:a16="http://schemas.microsoft.com/office/drawing/2014/main" id="{3C4D7AA9-9128-2337-E80D-6A8065AC3EF5}"/>
+                </a:ext>
+              </a:extLst>
+            </p:cNvPr>
+            <p:cNvPicPr>
+              <a:picLocks noChangeAspect="1"/>
+            </p:cNvPicPr>
+            <p:nvPr/>
+          </p:nvPicPr>
+          <p:blipFill>
+            <a:blip r:embed="rId18">
+              <a:extLst>
+                <a:ext uri="{28A0092B-C50C-407E-A947-70E740481C1C}">
+                  <a14:useLocalDpi xmlns:a14="http://schemas.microsoft.com/office/drawing/2010/main" val="0"/>
+                </a:ext>
+                <a:ext uri="{96DAC541-7B7A-43D3-8B79-37D633B846F1}">
+                  <asvg:svgBlip xmlns:asvg="http://schemas.microsoft.com/office/drawing/2016/SVG/main" r:embed="rId19"/>
+                </a:ext>
+              </a:extLst>
+            </a:blip>
+            <a:stretch>
+              <a:fillRect/>
+            </a:stretch>
+          </p:blipFill>
+          <p:spPr>
+            <a:xfrm>
+              <a:off x="3164370" y="2714405"/>
+              <a:ext cx="1232393" cy="1095460"/>
+            </a:xfrm>
+            <a:prstGeom prst="rect">
+              <a:avLst/>
+            </a:prstGeom>
+          </p:spPr>
+        </p:pic>
+      </p:grpSp>
+    </p:spTree>
+    <p:extLst>
+      <p:ext uri="{BB962C8B-B14F-4D97-AF65-F5344CB8AC3E}">
+        <p14:creationId xmlns:p14="http://schemas.microsoft.com/office/powerpoint/2010/main" val="92988948"/>
       </p:ext>
     </p:extLst>
   </p:cSld>

</xml_diff>